<commit_message>
fixed typos in slides
</commit_message>
<xml_diff>
--- a/node/lesson-47-testing/testing.pptx
+++ b/node/lesson-47-testing/testing.pptx
@@ -28,7 +28,7 @@
   <p:sldSz cx="9144000" cy="6858000" type="screen4x3"/>
   <p:notesSz cx="6858000" cy="9144000"/>
   <p:custDataLst>
-    <p:tags r:id="rId18"/>
+    <p:tags r:id="rId17"/>
   </p:custDataLst>
   <p:defaultTextStyle>
     <a:defPPr>
@@ -125,6 +125,71 @@
       </a:defRPr>
     </a:lvl9pPr>
   </p:defaultTextStyle>
+  <p:extLst>
+    <p:ext uri="{EFAFB233-063F-42B5-8137-9DF3F51BA10A}">
+      <p15:sldGuideLst xmlns:p15="http://schemas.microsoft.com/office/powerpoint/2012/main">
+        <p15:guide id="1" orient="horz" pos="4176">
+          <p15:clr>
+            <a:srgbClr val="A4A3A4"/>
+          </p15:clr>
+        </p15:guide>
+        <p15:guide id="2" orient="horz" pos="607">
+          <p15:clr>
+            <a:srgbClr val="A4A3A4"/>
+          </p15:clr>
+        </p15:guide>
+        <p15:guide id="3" orient="horz" pos="212">
+          <p15:clr>
+            <a:srgbClr val="A4A3A4"/>
+          </p15:clr>
+        </p15:guide>
+        <p15:guide id="4" orient="horz" pos="912">
+          <p15:clr>
+            <a:srgbClr val="A4A3A4"/>
+          </p15:clr>
+        </p15:guide>
+        <p15:guide id="5" orient="horz" pos="3969">
+          <p15:clr>
+            <a:srgbClr val="A4A3A4"/>
+          </p15:clr>
+        </p15:guide>
+        <p15:guide id="6" pos="1267">
+          <p15:clr>
+            <a:srgbClr val="A4A3A4"/>
+          </p15:clr>
+        </p15:guide>
+        <p15:guide id="7" pos="382">
+          <p15:clr>
+            <a:srgbClr val="A4A3A4"/>
+          </p15:clr>
+        </p15:guide>
+        <p15:guide id="8" pos="2880">
+          <p15:clr>
+            <a:srgbClr val="A4A3A4"/>
+          </p15:clr>
+        </p15:guide>
+        <p15:guide id="9" pos="5568">
+          <p15:clr>
+            <a:srgbClr val="A4A3A4"/>
+          </p15:clr>
+        </p15:guide>
+      </p15:sldGuideLst>
+    </p:ext>
+    <p:ext uri="{2D200454-40CA-4A62-9FC3-DE9A4176ACB9}">
+      <p15:notesGuideLst xmlns:p15="http://schemas.microsoft.com/office/powerpoint/2012/main">
+        <p15:guide id="1" orient="horz" pos="2880">
+          <p15:clr>
+            <a:srgbClr val="A4A3A4"/>
+          </p15:clr>
+        </p15:guide>
+        <p15:guide id="2" pos="2160">
+          <p15:clr>
+            <a:srgbClr val="A4A3A4"/>
+          </p15:clr>
+        </p15:guide>
+      </p15:notesGuideLst>
+    </p:ext>
+  </p:extLst>
 </p:presentation>
 </file>
 
@@ -1270,7 +1335,7 @@
   <p:timing>
     <p:tnLst>
       <p:par>
-        <p:cTn xmlns:p14="http://schemas.microsoft.com/office/powerpoint/2010/main" id="1" dur="indefinite" restart="never" nodeType="tmRoot"/>
+        <p:cTn id="1" dur="indefinite" restart="never" nodeType="tmRoot"/>
       </p:par>
     </p:tnLst>
   </p:timing>
@@ -1326,7 +1391,7 @@
           <a:noFill/>
           <a:extLst>
             <a:ext uri="{909E8E84-426E-40dd-AFC4-6F175D3DCCD1}">
-              <a14:hiddenFill xmlns:a14="http://schemas.microsoft.com/office/drawing/2010/main">
+              <a14:hiddenFill xmlns:a14="http://schemas.microsoft.com/office/drawing/2010/main" xmlns="">
                 <a:solidFill>
                   <a:srgbClr val="FFFFFF"/>
                 </a:solidFill>
@@ -1481,7 +1546,7 @@
   <p:timing>
     <p:tnLst>
       <p:par>
-        <p:cTn xmlns:p14="http://schemas.microsoft.com/office/powerpoint/2010/main" id="1" dur="indefinite" restart="never" nodeType="tmRoot"/>
+        <p:cTn id="1" dur="indefinite" restart="never" nodeType="tmRoot"/>
       </p:par>
     </p:tnLst>
   </p:timing>
@@ -1936,7 +2001,7 @@
   <p:timing>
     <p:tnLst>
       <p:par>
-        <p:cTn xmlns:p14="http://schemas.microsoft.com/office/powerpoint/2010/main" id="1" dur="indefinite" restart="never" nodeType="tmRoot"/>
+        <p:cTn id="1" dur="indefinite" restart="never" nodeType="tmRoot"/>
       </p:par>
     </p:tnLst>
   </p:timing>
@@ -2276,7 +2341,7 @@
   <p:timing>
     <p:tnLst>
       <p:par>
-        <p:cTn xmlns:p14="http://schemas.microsoft.com/office/powerpoint/2010/main" id="1" dur="indefinite" restart="never" nodeType="tmRoot"/>
+        <p:cTn id="1" dur="indefinite" restart="never" nodeType="tmRoot"/>
       </p:par>
     </p:tnLst>
   </p:timing>
@@ -2764,7 +2829,7 @@
   <p:timing>
     <p:tnLst>
       <p:par>
-        <p:cTn xmlns:p14="http://schemas.microsoft.com/office/powerpoint/2010/main" id="1" dur="indefinite" restart="never" nodeType="tmRoot"/>
+        <p:cTn id="1" dur="indefinite" restart="never" nodeType="tmRoot"/>
       </p:par>
     </p:tnLst>
   </p:timing>
@@ -3122,7 +3187,7 @@
   <p:timing>
     <p:tnLst>
       <p:par>
-        <p:cTn xmlns:p14="http://schemas.microsoft.com/office/powerpoint/2010/main" id="1" dur="indefinite" restart="never" nodeType="tmRoot"/>
+        <p:cTn id="1" dur="indefinite" restart="never" nodeType="tmRoot"/>
       </p:par>
     </p:tnLst>
   </p:timing>
@@ -3295,10 +3360,6 @@
               </a:rPr>
               <a:t>teardown()</a:t>
             </a:r>
-            <a:endParaRPr lang="en-US" sz="1600" dirty="0">
-              <a:latin typeface="Monaco"/>
-              <a:cs typeface="Monaco"/>
-            </a:endParaRPr>
           </a:p>
         </p:txBody>
       </p:sp>
@@ -3378,7 +3439,7 @@
   <p:timing>
     <p:tnLst>
       <p:par>
-        <p:cTn xmlns:p14="http://schemas.microsoft.com/office/powerpoint/2010/main" id="1" dur="indefinite" restart="never" nodeType="tmRoot"/>
+        <p:cTn id="1" dur="indefinite" restart="never" nodeType="tmRoot"/>
       </p:par>
     </p:tnLst>
   </p:timing>
@@ -3424,8 +3485,24 @@
               <a:rPr lang="en-US" dirty="0" smtClean="0"/>
               <a:t>The following would be run with </a:t>
             </a:r>
+            <a:endParaRPr lang="en-US" dirty="0" smtClean="0"/>
+          </a:p>
+          <a:p>
+            <a:pPr marL="0" indent="0">
+              <a:buNone/>
+            </a:pPr>
+            <a:r>
+              <a:rPr lang="en-US" sz="2000" dirty="0">
+                <a:latin typeface="Monaco"/>
+                <a:cs typeface="Monaco"/>
+              </a:rPr>
+              <a:t>	</a:t>
+            </a:r>
             <a:r>
               <a:rPr lang="en-US" sz="2000" dirty="0" smtClean="0">
+                <a:solidFill>
+                  <a:srgbClr val="FF0000"/>
+                </a:solidFill>
                 <a:latin typeface="Monaco"/>
                 <a:cs typeface="Monaco"/>
               </a:rPr>
@@ -3433,6 +3510,9 @@
             </a:r>
             <a:r>
               <a:rPr lang="en-US" sz="2000" dirty="0" err="1" smtClean="0">
+                <a:solidFill>
+                  <a:srgbClr val="FF0000"/>
+                </a:solidFill>
                 <a:latin typeface="Monaco"/>
                 <a:cs typeface="Monaco"/>
               </a:rPr>
@@ -3440,6 +3520,9 @@
             </a:r>
             <a:r>
               <a:rPr lang="en-US" sz="2000" dirty="0" smtClean="0">
+                <a:solidFill>
+                  <a:srgbClr val="FF0000"/>
+                </a:solidFill>
                 <a:latin typeface="Monaco"/>
                 <a:cs typeface="Monaco"/>
               </a:rPr>
@@ -3447,14 +3530,39 @@
             </a:r>
             <a:r>
               <a:rPr lang="en-US" sz="2000" dirty="0" err="1" smtClean="0">
+                <a:solidFill>
+                  <a:srgbClr val="FF0000"/>
+                </a:solidFill>
                 <a:latin typeface="Monaco"/>
                 <a:cs typeface="Monaco"/>
               </a:rPr>
               <a:t>tdd</a:t>
             </a:r>
             <a:r>
-              <a:rPr lang="en-US" dirty="0" smtClean="0"/>
-              <a:t> since it follows the TDD format</a:t>
+              <a:rPr lang="en-US" dirty="0" smtClean="0">
+                <a:solidFill>
+                  <a:srgbClr val="FF0000"/>
+                </a:solidFill>
+              </a:rPr>
+              <a:t> </a:t>
+            </a:r>
+            <a:endParaRPr lang="en-US" dirty="0" smtClean="0">
+              <a:solidFill>
+                <a:srgbClr val="FF0000"/>
+              </a:solidFill>
+            </a:endParaRPr>
+          </a:p>
+          <a:p>
+            <a:pPr marL="0" indent="0">
+              <a:buNone/>
+            </a:pPr>
+            <a:r>
+              <a:rPr lang="en-US" dirty="0" smtClean="0"/>
+              <a:t>since </a:t>
+            </a:r>
+            <a:r>
+              <a:rPr lang="en-US" dirty="0" smtClean="0"/>
+              <a:t>it follows the TDD format</a:t>
             </a:r>
             <a:endParaRPr lang="en-US" dirty="0"/>
           </a:p>
@@ -4247,7 +4355,7 @@
   <p:timing>
     <p:tnLst>
       <p:par>
-        <p:cTn xmlns:p14="http://schemas.microsoft.com/office/powerpoint/2010/main" id="1" dur="indefinite" restart="never" nodeType="tmRoot"/>
+        <p:cTn id="1" dur="indefinite" restart="never" nodeType="tmRoot"/>
       </p:par>
     </p:tnLst>
   </p:timing>
@@ -4436,7 +4544,7 @@
   <p:timing>
     <p:tnLst>
       <p:par>
-        <p:cTn xmlns:p14="http://schemas.microsoft.com/office/powerpoint/2010/main" id="1" dur="indefinite" restart="never" nodeType="tmRoot"/>
+        <p:cTn id="1" dur="indefinite" restart="never" nodeType="tmRoot"/>
       </p:par>
     </p:tnLst>
   </p:timing>
@@ -4623,7 +4731,7 @@
   <p:timing>
     <p:tnLst>
       <p:par>
-        <p:cTn xmlns:p14="http://schemas.microsoft.com/office/powerpoint/2010/main" id="1" dur="indefinite" restart="never" nodeType="tmRoot"/>
+        <p:cTn id="1" dur="indefinite" restart="never" nodeType="tmRoot"/>
       </p:par>
     </p:tnLst>
   </p:timing>
@@ -4784,7 +4892,7 @@
   <p:timing>
     <p:tnLst>
       <p:par>
-        <p:cTn xmlns:p14="http://schemas.microsoft.com/office/powerpoint/2010/main" id="1" dur="indefinite" restart="never" nodeType="tmRoot"/>
+        <p:cTn id="1" dur="indefinite" restart="never" nodeType="tmRoot"/>
       </p:par>
     </p:tnLst>
   </p:timing>
@@ -4926,7 +5034,7 @@
   <p:timing>
     <p:tnLst>
       <p:par>
-        <p:cTn xmlns:p14="http://schemas.microsoft.com/office/powerpoint/2010/main" id="1" dur="indefinite" restart="never" nodeType="tmRoot"/>
+        <p:cTn id="1" dur="indefinite" restart="never" nodeType="tmRoot"/>
       </p:par>
     </p:tnLst>
   </p:timing>
@@ -5158,7 +5266,7 @@
   <p:timing>
     <p:tnLst>
       <p:par>
-        <p:cTn xmlns:p14="http://schemas.microsoft.com/office/powerpoint/2010/main" id="1" dur="indefinite" restart="never" nodeType="tmRoot"/>
+        <p:cTn id="1" dur="indefinite" restart="never" nodeType="tmRoot"/>
       </p:par>
     </p:tnLst>
   </p:timing>
@@ -5851,7 +5959,7 @@
   <p:timing>
     <p:tnLst>
       <p:par>
-        <p:cTn xmlns:p14="http://schemas.microsoft.com/office/powerpoint/2010/main" id="1" dur="indefinite" restart="never" nodeType="tmRoot"/>
+        <p:cTn id="1" dur="indefinite" restart="never" nodeType="tmRoot"/>
       </p:par>
     </p:tnLst>
   </p:timing>
@@ -6015,7 +6123,7 @@
   <p:timing>
     <p:tnLst>
       <p:par>
-        <p:cTn xmlns:p14="http://schemas.microsoft.com/office/powerpoint/2010/main" id="1" dur="indefinite" restart="never" nodeType="tmRoot"/>
+        <p:cTn id="1" dur="indefinite" restart="never" nodeType="tmRoot"/>
       </p:par>
     </p:tnLst>
   </p:timing>
@@ -6218,7 +6326,7 @@
   <p:timing>
     <p:tnLst>
       <p:par>
-        <p:cTn xmlns:p14="http://schemas.microsoft.com/office/powerpoint/2010/main" id="1" dur="indefinite" restart="never" nodeType="tmRoot"/>
+        <p:cTn id="1" dur="indefinite" restart="never" nodeType="tmRoot"/>
       </p:par>
     </p:tnLst>
   </p:timing>
@@ -6796,7 +6904,7 @@
   <p:timing>
     <p:tnLst>
       <p:par>
-        <p:cTn xmlns:p14="http://schemas.microsoft.com/office/powerpoint/2010/main" id="1" dur="indefinite" restart="never" nodeType="tmRoot"/>
+        <p:cTn id="1" dur="indefinite" restart="never" nodeType="tmRoot"/>
       </p:par>
     </p:tnLst>
   </p:timing>
@@ -7585,7 +7693,7 @@
   <p:timing>
     <p:tnLst>
       <p:par>
-        <p:cTn xmlns:p14="http://schemas.microsoft.com/office/powerpoint/2010/main" id="1" dur="indefinite" restart="never" nodeType="tmRoot"/>
+        <p:cTn id="1" dur="indefinite" restart="never" nodeType="tmRoot"/>
       </p:par>
     </p:tnLst>
   </p:timing>

</xml_diff>